<commit_message>
adding version 1.1 of the ppt
</commit_message>
<xml_diff>
--- a/Presentation1.pptx
+++ b/Presentation1.pptx
@@ -10,6 +10,12 @@
     <p:sldId id="259" r:id="rId4"/>
     <p:sldId id="258" r:id="rId5"/>
     <p:sldId id="260" r:id="rId6"/>
+    <p:sldId id="261" r:id="rId7"/>
+    <p:sldId id="262" r:id="rId8"/>
+    <p:sldId id="263" r:id="rId9"/>
+    <p:sldId id="264" r:id="rId10"/>
+    <p:sldId id="265" r:id="rId11"/>
+    <p:sldId id="266" r:id="rId12"/>
   </p:sldIdLst>
   <p:sldSz cx="12192000" cy="6858000"/>
   <p:notesSz cx="6858000" cy="9144000"/>
@@ -108,6 +114,11 @@
       </a:defRPr>
     </a:lvl9pPr>
   </p:defaultTextStyle>
+  <p:extLst>
+    <p:ext uri="{EFAFB233-063F-42B5-8137-9DF3F51BA10A}">
+      <p15:sldGuideLst xmlns:p15="http://schemas.microsoft.com/office/powerpoint/2012/main"/>
+    </p:ext>
+  </p:extLst>
 </p:presentation>
 </file>
 
@@ -10055,6 +10066,176 @@
 </p:sld>
 </file>
 
+<file path=ppt/slides/slide10.xml><?xml version="1.0" encoding="utf-8"?>
+<p:sld xmlns:a="http://schemas.openxmlformats.org/drawingml/2006/main" xmlns:r="http://schemas.openxmlformats.org/officeDocument/2006/relationships" xmlns:p="http://schemas.openxmlformats.org/presentationml/2006/main">
+  <p:cSld>
+    <p:spTree>
+      <p:nvGrpSpPr>
+        <p:cNvPr id="1" name=""/>
+        <p:cNvGrpSpPr/>
+        <p:nvPr/>
+      </p:nvGrpSpPr>
+      <p:grpSpPr>
+        <a:xfrm>
+          <a:off x="0" y="0"/>
+          <a:ext cx="0" cy="0"/>
+          <a:chOff x="0" y="0"/>
+          <a:chExt cx="0" cy="0"/>
+        </a:xfrm>
+      </p:grpSpPr>
+      <p:sp>
+        <p:nvSpPr>
+          <p:cNvPr id="2" name="Title 1">
+            <a:extLst>
+              <a:ext uri="{FF2B5EF4-FFF2-40B4-BE49-F238E27FC236}">
+                <a16:creationId xmlns:a16="http://schemas.microsoft.com/office/drawing/2014/main" id="{B1FB4BFC-3E1F-244D-AB1C-13FCEAC0B5B2}"/>
+              </a:ext>
+            </a:extLst>
+          </p:cNvPr>
+          <p:cNvSpPr>
+            <a:spLocks noGrp="1"/>
+          </p:cNvSpPr>
+          <p:nvPr>
+            <p:ph type="title"/>
+          </p:nvPr>
+        </p:nvSpPr>
+        <p:spPr/>
+        <p:txBody>
+          <a:bodyPr/>
+          <a:lstStyle/>
+          <a:p>
+            <a:r>
+              <a:rPr lang="en-US" dirty="0"/>
+              <a:t>Starting Strategy</a:t>
+            </a:r>
+          </a:p>
+        </p:txBody>
+      </p:sp>
+      <p:sp>
+        <p:nvSpPr>
+          <p:cNvPr id="3" name="Content Placeholder 2">
+            <a:extLst>
+              <a:ext uri="{FF2B5EF4-FFF2-40B4-BE49-F238E27FC236}">
+                <a16:creationId xmlns:a16="http://schemas.microsoft.com/office/drawing/2014/main" id="{1AB8407D-1357-4444-B2F7-B32249551BFD}"/>
+              </a:ext>
+            </a:extLst>
+          </p:cNvPr>
+          <p:cNvSpPr>
+            <a:spLocks noGrp="1"/>
+          </p:cNvSpPr>
+          <p:nvPr>
+            <p:ph idx="1"/>
+          </p:nvPr>
+        </p:nvSpPr>
+        <p:spPr/>
+        <p:txBody>
+          <a:bodyPr/>
+          <a:lstStyle/>
+          <a:p>
+            <a:endParaRPr lang="en-US"/>
+          </a:p>
+        </p:txBody>
+      </p:sp>
+    </p:spTree>
+    <p:extLst>
+      <p:ext uri="{BB962C8B-B14F-4D97-AF65-F5344CB8AC3E}">
+        <p14:creationId xmlns:p14="http://schemas.microsoft.com/office/powerpoint/2010/main" val="1413717045"/>
+      </p:ext>
+    </p:extLst>
+  </p:cSld>
+  <p:clrMapOvr>
+    <a:masterClrMapping/>
+  </p:clrMapOvr>
+</p:sld>
+</file>
+
+<file path=ppt/slides/slide11.xml><?xml version="1.0" encoding="utf-8"?>
+<p:sld xmlns:a="http://schemas.openxmlformats.org/drawingml/2006/main" xmlns:r="http://schemas.openxmlformats.org/officeDocument/2006/relationships" xmlns:p="http://schemas.openxmlformats.org/presentationml/2006/main">
+  <p:cSld>
+    <p:spTree>
+      <p:nvGrpSpPr>
+        <p:cNvPr id="1" name=""/>
+        <p:cNvGrpSpPr/>
+        <p:nvPr/>
+      </p:nvGrpSpPr>
+      <p:grpSpPr>
+        <a:xfrm>
+          <a:off x="0" y="0"/>
+          <a:ext cx="0" cy="0"/>
+          <a:chOff x="0" y="0"/>
+          <a:chExt cx="0" cy="0"/>
+        </a:xfrm>
+      </p:grpSpPr>
+      <p:sp>
+        <p:nvSpPr>
+          <p:cNvPr id="2" name="Title 1">
+            <a:extLst>
+              <a:ext uri="{FF2B5EF4-FFF2-40B4-BE49-F238E27FC236}">
+                <a16:creationId xmlns:a16="http://schemas.microsoft.com/office/drawing/2014/main" id="{2EED1DF4-9F03-3B4E-879E-85A92870294A}"/>
+              </a:ext>
+            </a:extLst>
+          </p:cNvPr>
+          <p:cNvSpPr>
+            <a:spLocks noGrp="1"/>
+          </p:cNvSpPr>
+          <p:nvPr>
+            <p:ph type="title"/>
+          </p:nvPr>
+        </p:nvSpPr>
+        <p:spPr/>
+        <p:txBody>
+          <a:bodyPr/>
+          <a:lstStyle/>
+          <a:p>
+            <a:r>
+              <a:rPr lang="en-US" dirty="0"/>
+              <a:t>Tools used </a:t>
+            </a:r>
+            <a:r>
+              <a:rPr lang="en-US"/>
+              <a:t>for the team</a:t>
+            </a:r>
+          </a:p>
+        </p:txBody>
+      </p:sp>
+      <p:sp>
+        <p:nvSpPr>
+          <p:cNvPr id="3" name="Content Placeholder 2">
+            <a:extLst>
+              <a:ext uri="{FF2B5EF4-FFF2-40B4-BE49-F238E27FC236}">
+                <a16:creationId xmlns:a16="http://schemas.microsoft.com/office/drawing/2014/main" id="{E876763B-250F-5849-8583-536A89571C4B}"/>
+              </a:ext>
+            </a:extLst>
+          </p:cNvPr>
+          <p:cNvSpPr>
+            <a:spLocks noGrp="1"/>
+          </p:cNvSpPr>
+          <p:nvPr>
+            <p:ph idx="1"/>
+          </p:nvPr>
+        </p:nvSpPr>
+        <p:spPr/>
+        <p:txBody>
+          <a:bodyPr/>
+          <a:lstStyle/>
+          <a:p>
+            <a:endParaRPr lang="en-US"/>
+          </a:p>
+        </p:txBody>
+      </p:sp>
+    </p:spTree>
+    <p:extLst>
+      <p:ext uri="{BB962C8B-B14F-4D97-AF65-F5344CB8AC3E}">
+        <p14:creationId xmlns:p14="http://schemas.microsoft.com/office/powerpoint/2010/main" val="2786487850"/>
+      </p:ext>
+    </p:extLst>
+  </p:cSld>
+  <p:clrMapOvr>
+    <a:masterClrMapping/>
+  </p:clrMapOvr>
+</p:sld>
+</file>
+
 <file path=ppt/slides/slide2.xml><?xml version="1.0" encoding="utf-8"?>
 <p:sld xmlns:a="http://schemas.openxmlformats.org/drawingml/2006/main" xmlns:r="http://schemas.openxmlformats.org/officeDocument/2006/relationships" xmlns:p="http://schemas.openxmlformats.org/presentationml/2006/main">
   <p:cSld>
@@ -10584,7 +10765,10 @@
           <a:bodyPr/>
           <a:lstStyle/>
           <a:p>
-            <a:endParaRPr lang="en-US"/>
+            <a:r>
+              <a:rPr lang="en-US" dirty="0"/>
+              <a:t>Solution justification</a:t>
+            </a:r>
           </a:p>
         </p:txBody>
       </p:sp>
@@ -10617,6 +10801,338 @@
     <p:extLst>
       <p:ext uri="{BB962C8B-B14F-4D97-AF65-F5344CB8AC3E}">
         <p14:creationId xmlns:p14="http://schemas.microsoft.com/office/powerpoint/2010/main" val="137540016"/>
+      </p:ext>
+    </p:extLst>
+  </p:cSld>
+  <p:clrMapOvr>
+    <a:masterClrMapping/>
+  </p:clrMapOvr>
+</p:sld>
+</file>
+
+<file path=ppt/slides/slide6.xml><?xml version="1.0" encoding="utf-8"?>
+<p:sld xmlns:a="http://schemas.openxmlformats.org/drawingml/2006/main" xmlns:r="http://schemas.openxmlformats.org/officeDocument/2006/relationships" xmlns:p="http://schemas.openxmlformats.org/presentationml/2006/main">
+  <p:cSld>
+    <p:spTree>
+      <p:nvGrpSpPr>
+        <p:cNvPr id="1" name=""/>
+        <p:cNvGrpSpPr/>
+        <p:nvPr/>
+      </p:nvGrpSpPr>
+      <p:grpSpPr>
+        <a:xfrm>
+          <a:off x="0" y="0"/>
+          <a:ext cx="0" cy="0"/>
+          <a:chOff x="0" y="0"/>
+          <a:chExt cx="0" cy="0"/>
+        </a:xfrm>
+      </p:grpSpPr>
+      <p:sp>
+        <p:nvSpPr>
+          <p:cNvPr id="2" name="Title 1">
+            <a:extLst>
+              <a:ext uri="{FF2B5EF4-FFF2-40B4-BE49-F238E27FC236}">
+                <a16:creationId xmlns:a16="http://schemas.microsoft.com/office/drawing/2014/main" id="{FB770423-B844-0E4B-8C1F-F8A5FBD1AC7A}"/>
+              </a:ext>
+            </a:extLst>
+          </p:cNvPr>
+          <p:cNvSpPr>
+            <a:spLocks noGrp="1"/>
+          </p:cNvSpPr>
+          <p:nvPr>
+            <p:ph type="title"/>
+          </p:nvPr>
+        </p:nvSpPr>
+        <p:spPr/>
+        <p:txBody>
+          <a:bodyPr/>
+          <a:lstStyle/>
+          <a:p>
+            <a:r>
+              <a:rPr lang="en-US" dirty="0"/>
+              <a:t>Market limitation</a:t>
+            </a:r>
+          </a:p>
+        </p:txBody>
+      </p:sp>
+      <p:sp>
+        <p:nvSpPr>
+          <p:cNvPr id="3" name="Content Placeholder 2">
+            <a:extLst>
+              <a:ext uri="{FF2B5EF4-FFF2-40B4-BE49-F238E27FC236}">
+                <a16:creationId xmlns:a16="http://schemas.microsoft.com/office/drawing/2014/main" id="{1720EC8C-F0F1-F248-9BE3-125DD3498BE3}"/>
+              </a:ext>
+            </a:extLst>
+          </p:cNvPr>
+          <p:cNvSpPr>
+            <a:spLocks noGrp="1"/>
+          </p:cNvSpPr>
+          <p:nvPr>
+            <p:ph idx="1"/>
+          </p:nvPr>
+        </p:nvSpPr>
+        <p:spPr/>
+        <p:txBody>
+          <a:bodyPr/>
+          <a:lstStyle/>
+          <a:p>
+            <a:endParaRPr lang="en-US"/>
+          </a:p>
+        </p:txBody>
+      </p:sp>
+    </p:spTree>
+    <p:extLst>
+      <p:ext uri="{BB962C8B-B14F-4D97-AF65-F5344CB8AC3E}">
+        <p14:creationId xmlns:p14="http://schemas.microsoft.com/office/powerpoint/2010/main" val="333492362"/>
+      </p:ext>
+    </p:extLst>
+  </p:cSld>
+  <p:clrMapOvr>
+    <a:masterClrMapping/>
+  </p:clrMapOvr>
+</p:sld>
+</file>
+
+<file path=ppt/slides/slide7.xml><?xml version="1.0" encoding="utf-8"?>
+<p:sld xmlns:a="http://schemas.openxmlformats.org/drawingml/2006/main" xmlns:r="http://schemas.openxmlformats.org/officeDocument/2006/relationships" xmlns:p="http://schemas.openxmlformats.org/presentationml/2006/main">
+  <p:cSld>
+    <p:spTree>
+      <p:nvGrpSpPr>
+        <p:cNvPr id="1" name=""/>
+        <p:cNvGrpSpPr/>
+        <p:nvPr/>
+      </p:nvGrpSpPr>
+      <p:grpSpPr>
+        <a:xfrm>
+          <a:off x="0" y="0"/>
+          <a:ext cx="0" cy="0"/>
+          <a:chOff x="0" y="0"/>
+          <a:chExt cx="0" cy="0"/>
+        </a:xfrm>
+      </p:grpSpPr>
+      <p:sp>
+        <p:nvSpPr>
+          <p:cNvPr id="2" name="Title 1">
+            <a:extLst>
+              <a:ext uri="{FF2B5EF4-FFF2-40B4-BE49-F238E27FC236}">
+                <a16:creationId xmlns:a16="http://schemas.microsoft.com/office/drawing/2014/main" id="{051F0040-B05B-9344-BDD9-194088D3EB9B}"/>
+              </a:ext>
+            </a:extLst>
+          </p:cNvPr>
+          <p:cNvSpPr>
+            <a:spLocks noGrp="1"/>
+          </p:cNvSpPr>
+          <p:nvPr>
+            <p:ph type="title"/>
+          </p:nvPr>
+        </p:nvSpPr>
+        <p:spPr/>
+        <p:txBody>
+          <a:bodyPr/>
+          <a:lstStyle/>
+          <a:p>
+            <a:r>
+              <a:rPr lang="en-US" dirty="0"/>
+              <a:t>Target market </a:t>
+            </a:r>
+          </a:p>
+        </p:txBody>
+      </p:sp>
+      <p:sp>
+        <p:nvSpPr>
+          <p:cNvPr id="3" name="Content Placeholder 2">
+            <a:extLst>
+              <a:ext uri="{FF2B5EF4-FFF2-40B4-BE49-F238E27FC236}">
+                <a16:creationId xmlns:a16="http://schemas.microsoft.com/office/drawing/2014/main" id="{DF6AA163-DB48-2142-931C-546C06144F48}"/>
+              </a:ext>
+            </a:extLst>
+          </p:cNvPr>
+          <p:cNvSpPr>
+            <a:spLocks noGrp="1"/>
+          </p:cNvSpPr>
+          <p:nvPr>
+            <p:ph idx="1"/>
+          </p:nvPr>
+        </p:nvSpPr>
+        <p:spPr/>
+        <p:txBody>
+          <a:bodyPr/>
+          <a:lstStyle/>
+          <a:p>
+            <a:endParaRPr lang="en-US"/>
+          </a:p>
+        </p:txBody>
+      </p:sp>
+    </p:spTree>
+    <p:extLst>
+      <p:ext uri="{BB962C8B-B14F-4D97-AF65-F5344CB8AC3E}">
+        <p14:creationId xmlns:p14="http://schemas.microsoft.com/office/powerpoint/2010/main" val="1007954622"/>
+      </p:ext>
+    </p:extLst>
+  </p:cSld>
+  <p:clrMapOvr>
+    <a:masterClrMapping/>
+  </p:clrMapOvr>
+</p:sld>
+</file>
+
+<file path=ppt/slides/slide8.xml><?xml version="1.0" encoding="utf-8"?>
+<p:sld xmlns:a="http://schemas.openxmlformats.org/drawingml/2006/main" xmlns:r="http://schemas.openxmlformats.org/officeDocument/2006/relationships" xmlns:p="http://schemas.openxmlformats.org/presentationml/2006/main">
+  <p:cSld>
+    <p:spTree>
+      <p:nvGrpSpPr>
+        <p:cNvPr id="1" name=""/>
+        <p:cNvGrpSpPr/>
+        <p:nvPr/>
+      </p:nvGrpSpPr>
+      <p:grpSpPr>
+        <a:xfrm>
+          <a:off x="0" y="0"/>
+          <a:ext cx="0" cy="0"/>
+          <a:chOff x="0" y="0"/>
+          <a:chExt cx="0" cy="0"/>
+        </a:xfrm>
+      </p:grpSpPr>
+      <p:sp>
+        <p:nvSpPr>
+          <p:cNvPr id="2" name="Title 1">
+            <a:extLst>
+              <a:ext uri="{FF2B5EF4-FFF2-40B4-BE49-F238E27FC236}">
+                <a16:creationId xmlns:a16="http://schemas.microsoft.com/office/drawing/2014/main" id="{23893865-7AEB-7748-B375-A62FF3E166AE}"/>
+              </a:ext>
+            </a:extLst>
+          </p:cNvPr>
+          <p:cNvSpPr>
+            <a:spLocks noGrp="1"/>
+          </p:cNvSpPr>
+          <p:nvPr>
+            <p:ph type="title"/>
+          </p:nvPr>
+        </p:nvSpPr>
+        <p:spPr/>
+        <p:txBody>
+          <a:bodyPr/>
+          <a:lstStyle/>
+          <a:p>
+            <a:r>
+              <a:rPr lang="en-US" dirty="0"/>
+              <a:t>Business Model/Money making points</a:t>
+            </a:r>
+          </a:p>
+        </p:txBody>
+      </p:sp>
+      <p:sp>
+        <p:nvSpPr>
+          <p:cNvPr id="3" name="Content Placeholder 2">
+            <a:extLst>
+              <a:ext uri="{FF2B5EF4-FFF2-40B4-BE49-F238E27FC236}">
+                <a16:creationId xmlns:a16="http://schemas.microsoft.com/office/drawing/2014/main" id="{F4598C82-3867-1B42-A4CE-A506366BC0F3}"/>
+              </a:ext>
+            </a:extLst>
+          </p:cNvPr>
+          <p:cNvSpPr>
+            <a:spLocks noGrp="1"/>
+          </p:cNvSpPr>
+          <p:nvPr>
+            <p:ph idx="1"/>
+          </p:nvPr>
+        </p:nvSpPr>
+        <p:spPr/>
+        <p:txBody>
+          <a:bodyPr/>
+          <a:lstStyle/>
+          <a:p>
+            <a:endParaRPr lang="en-US"/>
+          </a:p>
+        </p:txBody>
+      </p:sp>
+    </p:spTree>
+    <p:extLst>
+      <p:ext uri="{BB962C8B-B14F-4D97-AF65-F5344CB8AC3E}">
+        <p14:creationId xmlns:p14="http://schemas.microsoft.com/office/powerpoint/2010/main" val="1128195964"/>
+      </p:ext>
+    </p:extLst>
+  </p:cSld>
+  <p:clrMapOvr>
+    <a:masterClrMapping/>
+  </p:clrMapOvr>
+</p:sld>
+</file>
+
+<file path=ppt/slides/slide9.xml><?xml version="1.0" encoding="utf-8"?>
+<p:sld xmlns:a="http://schemas.openxmlformats.org/drawingml/2006/main" xmlns:r="http://schemas.openxmlformats.org/officeDocument/2006/relationships" xmlns:p="http://schemas.openxmlformats.org/presentationml/2006/main">
+  <p:cSld>
+    <p:spTree>
+      <p:nvGrpSpPr>
+        <p:cNvPr id="1" name=""/>
+        <p:cNvGrpSpPr/>
+        <p:nvPr/>
+      </p:nvGrpSpPr>
+      <p:grpSpPr>
+        <a:xfrm>
+          <a:off x="0" y="0"/>
+          <a:ext cx="0" cy="0"/>
+          <a:chOff x="0" y="0"/>
+          <a:chExt cx="0" cy="0"/>
+        </a:xfrm>
+      </p:grpSpPr>
+      <p:sp>
+        <p:nvSpPr>
+          <p:cNvPr id="2" name="Title 1">
+            <a:extLst>
+              <a:ext uri="{FF2B5EF4-FFF2-40B4-BE49-F238E27FC236}">
+                <a16:creationId xmlns:a16="http://schemas.microsoft.com/office/drawing/2014/main" id="{9064957A-9D44-5542-A1E2-134F7E5B655E}"/>
+              </a:ext>
+            </a:extLst>
+          </p:cNvPr>
+          <p:cNvSpPr>
+            <a:spLocks noGrp="1"/>
+          </p:cNvSpPr>
+          <p:nvPr>
+            <p:ph type="title"/>
+          </p:nvPr>
+        </p:nvSpPr>
+        <p:spPr/>
+        <p:txBody>
+          <a:bodyPr/>
+          <a:lstStyle/>
+          <a:p>
+            <a:r>
+              <a:rPr lang="en-US" dirty="0"/>
+              <a:t>Team members selections and contribution</a:t>
+            </a:r>
+          </a:p>
+        </p:txBody>
+      </p:sp>
+      <p:sp>
+        <p:nvSpPr>
+          <p:cNvPr id="3" name="Content Placeholder 2">
+            <a:extLst>
+              <a:ext uri="{FF2B5EF4-FFF2-40B4-BE49-F238E27FC236}">
+                <a16:creationId xmlns:a16="http://schemas.microsoft.com/office/drawing/2014/main" id="{30A2AA89-D7C2-E943-8498-CBFB6C8EAC3B}"/>
+              </a:ext>
+            </a:extLst>
+          </p:cNvPr>
+          <p:cNvSpPr>
+            <a:spLocks noGrp="1"/>
+          </p:cNvSpPr>
+          <p:nvPr>
+            <p:ph idx="1"/>
+          </p:nvPr>
+        </p:nvSpPr>
+        <p:spPr/>
+        <p:txBody>
+          <a:bodyPr/>
+          <a:lstStyle/>
+          <a:p>
+            <a:endParaRPr lang="en-US"/>
+          </a:p>
+        </p:txBody>
+      </p:sp>
+    </p:spTree>
+    <p:extLst>
+      <p:ext uri="{BB962C8B-B14F-4D97-AF65-F5344CB8AC3E}">
+        <p14:creationId xmlns:p14="http://schemas.microsoft.com/office/powerpoint/2010/main" val="2328659436"/>
       </p:ext>
     </p:extLst>
   </p:cSld>

</xml_diff>

<commit_message>
added the Business Model portion.
</commit_message>
<xml_diff>
--- a/Presentation1.pptx
+++ b/Presentation1.pptx
@@ -686,7 +686,7 @@
           <a:p>
             <a:fld id="{D6D0F569-AC90-44EB-9EF4-4E5C2F5D823C}" type="datetime1">
               <a:rPr lang="en-US" smtClean="0"/>
-              <a:t>9/5/21</a:t>
+              <a:t>9/7/2021</a:t>
             </a:fld>
             <a:endParaRPr lang="en-US" dirty="0"/>
           </a:p>
@@ -1363,7 +1363,7 @@
           <a:p>
             <a:fld id="{46BA7D41-E8B7-4A0B-B861-3EC4AE88917D}" type="datetime1">
               <a:rPr lang="en-US" smtClean="0"/>
-              <a:t>9/5/21</a:t>
+              <a:t>9/7/2021</a:t>
             </a:fld>
             <a:endParaRPr lang="en-US" dirty="0"/>
           </a:p>
@@ -2050,7 +2050,7 @@
           <a:p>
             <a:fld id="{A7C34823-0B19-4B4E-A643-7A3B0A3D24D6}" type="datetime1">
               <a:rPr lang="en-US" smtClean="0"/>
-              <a:t>9/5/21</a:t>
+              <a:t>9/7/2021</a:t>
             </a:fld>
             <a:endParaRPr lang="en-US" dirty="0"/>
           </a:p>
@@ -2730,7 +2730,7 @@
           <a:p>
             <a:fld id="{8C2D79EF-17C8-45D8-9866-DAF5723FC604}" type="datetime1">
               <a:rPr lang="en-US" smtClean="0"/>
-              <a:t>9/5/21</a:t>
+              <a:t>9/7/2021</a:t>
             </a:fld>
             <a:endParaRPr lang="en-US" dirty="0"/>
           </a:p>
@@ -3484,7 +3484,7 @@
           <a:p>
             <a:fld id="{DFFC2ADC-3680-4013-A757-E4663495DB98}" type="datetime1">
               <a:rPr lang="en-US" smtClean="0"/>
-              <a:t>9/5/21</a:t>
+              <a:t>9/7/2021</a:t>
             </a:fld>
             <a:endParaRPr lang="en-US" dirty="0"/>
           </a:p>
@@ -4228,7 +4228,7 @@
           <a:p>
             <a:fld id="{4751BA94-5DCA-4F19-960F-0FB2BD5EE85A}" type="datetime1">
               <a:rPr lang="en-US" smtClean="0"/>
-              <a:t>9/5/21</a:t>
+              <a:t>9/7/2021</a:t>
             </a:fld>
             <a:endParaRPr lang="en-US" dirty="0"/>
           </a:p>
@@ -5119,7 +5119,7 @@
           <a:p>
             <a:fld id="{01BED947-38D9-44AC-8B89-E79758333B77}" type="datetime1">
               <a:rPr lang="en-US" smtClean="0"/>
-              <a:t>9/5/21</a:t>
+              <a:t>9/7/2021</a:t>
             </a:fld>
             <a:endParaRPr lang="en-US" dirty="0"/>
           </a:p>
@@ -5739,7 +5739,7 @@
           <a:p>
             <a:fld id="{3781E23F-BD3C-4F23-B116-2B758120C8AC}" type="datetime1">
               <a:rPr lang="en-US" smtClean="0"/>
-              <a:t>9/5/21</a:t>
+              <a:t>9/7/2021</a:t>
             </a:fld>
             <a:endParaRPr lang="en-US" dirty="0"/>
           </a:p>
@@ -6331,7 +6331,7 @@
           <a:p>
             <a:fld id="{473CFAA9-6D59-4D98-869E-ACBDB83B2CA4}" type="datetime1">
               <a:rPr lang="en-US" smtClean="0"/>
-              <a:t>9/5/21</a:t>
+              <a:t>9/7/2021</a:t>
             </a:fld>
             <a:endParaRPr lang="en-US"/>
           </a:p>
@@ -7121,7 +7121,7 @@
           <a:p>
             <a:fld id="{DC410804-27E3-430A-BB42-B831260DE39A}" type="datetime1">
               <a:rPr lang="en-US" smtClean="0"/>
-              <a:t>9/5/21</a:t>
+              <a:t>9/7/2021</a:t>
             </a:fld>
             <a:endParaRPr lang="en-US" dirty="0"/>
           </a:p>
@@ -7891,7 +7891,7 @@
           <a:p>
             <a:fld id="{60E22DE3-3D1A-4D53-B9A6-6C7463B8C992}" type="datetime1">
               <a:rPr lang="en-US" smtClean="0"/>
-              <a:t>9/5/21</a:t>
+              <a:t>9/7/2021</a:t>
             </a:fld>
             <a:endParaRPr lang="en-US" dirty="0"/>
           </a:p>
@@ -8200,7 +8200,7 @@
             <a:fld id="{5ECD8B30-1B71-45A1-8314-D59C86F581E1}" type="datetime1">
               <a:rPr lang="en-US" smtClean="0"/>
               <a:pPr/>
-              <a:t>9/5/21</a:t>
+              <a:t>9/7/2021</a:t>
             </a:fld>
             <a:endParaRPr lang="en-US" b="1" dirty="0"/>
           </a:p>
@@ -11035,10 +11035,38 @@
         </p:nvSpPr>
         <p:spPr/>
         <p:txBody>
-          <a:bodyPr/>
+          <a:bodyPr>
+            <a:normAutofit fontScale="85000" lnSpcReduction="10000"/>
+          </a:bodyPr>
           <a:lstStyle/>
           <a:p>
-            <a:endParaRPr lang="en-US"/>
+            <a:r>
+              <a:rPr lang="en-US" dirty="0"/>
+              <a:t>Providing a  solid solution that fits to our targeted audience, and by delivering the type of service that this solution provides to help with addressing the busy schedule of the family members, many of our customers would be obliged to sign up for a paid version after a promotional period of free-trial to test the app.</a:t>
+            </a:r>
+          </a:p>
+          <a:p>
+            <a:r>
+              <a:rPr lang="en-US" dirty="0"/>
+              <a:t>Our money-making subscription would be very much affordable and could be as cheap as $99 a family where we can bring more members to the application to make more money.</a:t>
+            </a:r>
+          </a:p>
+          <a:p>
+            <a:r>
+              <a:rPr lang="en-US" dirty="0"/>
+              <a:t>Having lower subscription cost can give an assurance to our users and with this reasonable rate and helpful, managing features that we offer, we can satisfy our users’ needs and help them to make a choice for a long-term subscription.</a:t>
+            </a:r>
+          </a:p>
+          <a:p>
+            <a:r>
+              <a:rPr lang="en-US" dirty="0"/>
+              <a:t>The users of the Family App will be given a 30 day trial period which would include all the features. After the trail period expires, they can opt for the paid version to continue enjoy all the perks and features offered y </a:t>
+            </a:r>
+            <a:r>
+              <a:rPr lang="en-US"/>
+              <a:t>the Family App.</a:t>
+            </a:r>
+            <a:endParaRPr lang="en-US" dirty="0"/>
           </a:p>
         </p:txBody>
       </p:sp>

</xml_diff>

<commit_message>
canging price of subscription
</commit_message>
<xml_diff>
--- a/Presentation1.pptx
+++ b/Presentation1.pptx
@@ -686,7 +686,7 @@
           <a:p>
             <a:fld id="{D6D0F569-AC90-44EB-9EF4-4E5C2F5D823C}" type="datetime1">
               <a:rPr lang="en-US" smtClean="0"/>
-              <a:t>9/7/2021</a:t>
+              <a:t>9/8/21</a:t>
             </a:fld>
             <a:endParaRPr lang="en-US" dirty="0"/>
           </a:p>
@@ -1363,7 +1363,7 @@
           <a:p>
             <a:fld id="{46BA7D41-E8B7-4A0B-B861-3EC4AE88917D}" type="datetime1">
               <a:rPr lang="en-US" smtClean="0"/>
-              <a:t>9/7/2021</a:t>
+              <a:t>9/8/21</a:t>
             </a:fld>
             <a:endParaRPr lang="en-US" dirty="0"/>
           </a:p>
@@ -2050,7 +2050,7 @@
           <a:p>
             <a:fld id="{A7C34823-0B19-4B4E-A643-7A3B0A3D24D6}" type="datetime1">
               <a:rPr lang="en-US" smtClean="0"/>
-              <a:t>9/7/2021</a:t>
+              <a:t>9/8/21</a:t>
             </a:fld>
             <a:endParaRPr lang="en-US" dirty="0"/>
           </a:p>
@@ -2730,7 +2730,7 @@
           <a:p>
             <a:fld id="{8C2D79EF-17C8-45D8-9866-DAF5723FC604}" type="datetime1">
               <a:rPr lang="en-US" smtClean="0"/>
-              <a:t>9/7/2021</a:t>
+              <a:t>9/8/21</a:t>
             </a:fld>
             <a:endParaRPr lang="en-US" dirty="0"/>
           </a:p>
@@ -3484,7 +3484,7 @@
           <a:p>
             <a:fld id="{DFFC2ADC-3680-4013-A757-E4663495DB98}" type="datetime1">
               <a:rPr lang="en-US" smtClean="0"/>
-              <a:t>9/7/2021</a:t>
+              <a:t>9/8/21</a:t>
             </a:fld>
             <a:endParaRPr lang="en-US" dirty="0"/>
           </a:p>
@@ -4228,7 +4228,7 @@
           <a:p>
             <a:fld id="{4751BA94-5DCA-4F19-960F-0FB2BD5EE85A}" type="datetime1">
               <a:rPr lang="en-US" smtClean="0"/>
-              <a:t>9/7/2021</a:t>
+              <a:t>9/8/21</a:t>
             </a:fld>
             <a:endParaRPr lang="en-US" dirty="0"/>
           </a:p>
@@ -5119,7 +5119,7 @@
           <a:p>
             <a:fld id="{01BED947-38D9-44AC-8B89-E79758333B77}" type="datetime1">
               <a:rPr lang="en-US" smtClean="0"/>
-              <a:t>9/7/2021</a:t>
+              <a:t>9/8/21</a:t>
             </a:fld>
             <a:endParaRPr lang="en-US" dirty="0"/>
           </a:p>
@@ -5739,7 +5739,7 @@
           <a:p>
             <a:fld id="{3781E23F-BD3C-4F23-B116-2B758120C8AC}" type="datetime1">
               <a:rPr lang="en-US" smtClean="0"/>
-              <a:t>9/7/2021</a:t>
+              <a:t>9/8/21</a:t>
             </a:fld>
             <a:endParaRPr lang="en-US" dirty="0"/>
           </a:p>
@@ -6331,7 +6331,7 @@
           <a:p>
             <a:fld id="{473CFAA9-6D59-4D98-869E-ACBDB83B2CA4}" type="datetime1">
               <a:rPr lang="en-US" smtClean="0"/>
-              <a:t>9/7/2021</a:t>
+              <a:t>9/8/21</a:t>
             </a:fld>
             <a:endParaRPr lang="en-US"/>
           </a:p>
@@ -7121,7 +7121,7 @@
           <a:p>
             <a:fld id="{DC410804-27E3-430A-BB42-B831260DE39A}" type="datetime1">
               <a:rPr lang="en-US" smtClean="0"/>
-              <a:t>9/7/2021</a:t>
+              <a:t>9/8/21</a:t>
             </a:fld>
             <a:endParaRPr lang="en-US" dirty="0"/>
           </a:p>
@@ -7891,7 +7891,7 @@
           <a:p>
             <a:fld id="{60E22DE3-3D1A-4D53-B9A6-6C7463B8C992}" type="datetime1">
               <a:rPr lang="en-US" smtClean="0"/>
-              <a:t>9/7/2021</a:t>
+              <a:t>9/8/21</a:t>
             </a:fld>
             <a:endParaRPr lang="en-US" dirty="0"/>
           </a:p>
@@ -8200,7 +8200,7 @@
             <a:fld id="{5ECD8B30-1B71-45A1-8314-D59C86F581E1}" type="datetime1">
               <a:rPr lang="en-US" smtClean="0"/>
               <a:pPr/>
-              <a:t>9/7/2021</a:t>
+              <a:t>9/8/21</a:t>
             </a:fld>
             <a:endParaRPr lang="en-US" b="1" dirty="0"/>
           </a:p>
@@ -11048,7 +11048,15 @@
           <a:p>
             <a:r>
               <a:rPr lang="en-US" dirty="0"/>
-              <a:t>Our money-making subscription would be very much affordable and could be as cheap as $99 a family where we can bring more members to the application to make more money.</a:t>
+              <a:t>Our money-making subscription would be very much affordable and could be as cheap </a:t>
+            </a:r>
+            <a:r>
+              <a:rPr lang="en-US"/>
+              <a:t>as $0.99 </a:t>
+            </a:r>
+            <a:r>
+              <a:rPr lang="en-US" dirty="0"/>
+              <a:t>a family where we can bring more members to the application to make more money.</a:t>
             </a:r>
           </a:p>
           <a:p>
@@ -11060,13 +11068,8 @@
           <a:p>
             <a:r>
               <a:rPr lang="en-US" dirty="0"/>
-              <a:t>The users of the Family App will be given a 30 day trial period which would include all the features. After the trail period expires, they can opt for the paid version to continue enjoy all the perks and features offered y </a:t>
-            </a:r>
-            <a:r>
-              <a:rPr lang="en-US"/>
-              <a:t>the Family App.</a:t>
-            </a:r>
-            <a:endParaRPr lang="en-US" dirty="0"/>
+              <a:t>The users of the Family App will be given a 30 day trial period which would include all the features. After the trail period expires, they can opt for the paid version to continue enjoy all the perks and features offered y the Family App.</a:t>
+            </a:r>
           </a:p>
         </p:txBody>
       </p:sp>

</xml_diff>